<commit_message>
Better Readme + bug fixes
</commit_message>
<xml_diff>
--- a/documentation/ProjectPresentation.pptx
+++ b/documentation/ProjectPresentation.pptx
@@ -273,6 +273,11 @@
       </a:defRPr>
     </a:lvl9pPr>
   </p:defaultTextStyle>
+  <p:extLst>
+    <p:ext uri="{EFAFB233-063F-42B5-8137-9DF3F51BA10A}">
+      <p15:sldGuideLst xmlns:p15="http://schemas.microsoft.com/office/powerpoint/2012/main"/>
+    </p:ext>
+  </p:extLst>
 </p:presentation>
 </file>
 
@@ -16034,64 +16039,6 @@
           </a:p>
         </p:txBody>
       </p:sp>
-      <p:sp>
-        <p:nvSpPr>
-          <p:cNvPr id="1069" name="Google Shape;1069;p71"/>
-          <p:cNvSpPr txBox="1"/>
-          <p:nvPr/>
-        </p:nvSpPr>
-        <p:spPr>
-          <a:xfrm>
-            <a:off x="837078" y="2455377"/>
-            <a:ext cx="4151700" cy="260400"/>
-          </a:xfrm>
-          <a:prstGeom prst="rect">
-            <a:avLst/>
-          </a:prstGeom>
-          <a:noFill/>
-          <a:ln>
-            <a:noFill/>
-          </a:ln>
-        </p:spPr>
-        <p:txBody>
-          <a:bodyPr spcFirstLastPara="1" wrap="square" lIns="91425" tIns="91425" rIns="91425" bIns="91425" anchor="t" anchorCtr="0">
-            <a:noAutofit/>
-          </a:bodyPr>
-          <a:lstStyle/>
-          <a:p>
-            <a:pPr marL="0" lvl="0" indent="0" algn="l" rtl="0">
-              <a:spcBef>
-                <a:spcPts val="0"/>
-              </a:spcBef>
-              <a:spcAft>
-                <a:spcPts val="0"/>
-              </a:spcAft>
-              <a:buNone/>
-            </a:pPr>
-            <a:r>
-              <a:rPr lang="en" sz="1200" b="1">
-                <a:solidFill>
-                  <a:schemeClr val="dk1"/>
-                </a:solidFill>
-                <a:latin typeface="Montserrat"/>
-                <a:ea typeface="Montserrat"/>
-                <a:cs typeface="Montserrat"/>
-                <a:sym typeface="Montserrat"/>
-              </a:rPr>
-              <a:t>Please keep this slide for attribution</a:t>
-            </a:r>
-            <a:endParaRPr sz="1200" b="1">
-              <a:solidFill>
-                <a:schemeClr val="dk1"/>
-              </a:solidFill>
-              <a:latin typeface="Montserrat"/>
-              <a:ea typeface="Montserrat"/>
-              <a:cs typeface="Montserrat"/>
-              <a:sym typeface="Montserrat"/>
-            </a:endParaRPr>
-          </a:p>
-        </p:txBody>
-      </p:sp>
       <p:pic>
         <p:nvPicPr>
           <p:cNvPr id="1084" name="Google Shape;1084;p71"/>

</xml_diff>

<commit_message>
A bit of documentation and bug fixes
</commit_message>
<xml_diff>
--- a/documentation/ProjectPresentation.pptx
+++ b/documentation/ProjectPresentation.pptx
@@ -11527,7 +11527,7 @@
         </p:nvSpPr>
         <p:spPr>
           <a:xfrm>
-            <a:off x="720000" y="3153543"/>
+            <a:off x="1725286" y="2936133"/>
             <a:ext cx="767700" cy="447600"/>
           </a:xfrm>
           <a:prstGeom prst="rect">
@@ -11611,7 +11611,7 @@
         </p:nvSpPr>
         <p:spPr>
           <a:xfrm>
-            <a:off x="3367204" y="3153543"/>
+            <a:off x="4372490" y="2936133"/>
             <a:ext cx="767700" cy="447600"/>
           </a:xfrm>
           <a:prstGeom prst="rect">
@@ -11634,10 +11634,10 @@
               <a:buNone/>
             </a:pPr>
             <a:r>
-              <a:rPr lang="en"/>
+              <a:rPr lang="en" dirty="0"/>
               <a:t>05</a:t>
             </a:r>
-            <a:endParaRPr/>
+            <a:endParaRPr dirty="0"/>
           </a:p>
         </p:txBody>
       </p:sp>
@@ -11678,48 +11678,6 @@
             <a:r>
               <a:rPr lang="en"/>
               <a:t>03</a:t>
-            </a:r>
-            <a:endParaRPr/>
-          </a:p>
-        </p:txBody>
-      </p:sp>
-      <p:sp>
-        <p:nvSpPr>
-          <p:cNvPr id="474" name="Google Shape;474;p39"/>
-          <p:cNvSpPr txBox="1">
-            <a:spLocks noGrp="1"/>
-          </p:cNvSpPr>
-          <p:nvPr>
-            <p:ph type="title" idx="15"/>
-          </p:nvPr>
-        </p:nvSpPr>
-        <p:spPr>
-          <a:xfrm>
-            <a:off x="6014390" y="3153543"/>
-            <a:ext cx="767700" cy="447600"/>
-          </a:xfrm>
-          <a:prstGeom prst="rect">
-            <a:avLst/>
-          </a:prstGeom>
-        </p:spPr>
-        <p:txBody>
-          <a:bodyPr spcFirstLastPara="1" wrap="square" lIns="91425" tIns="91425" rIns="91425" bIns="91425" anchor="ctr" anchorCtr="0">
-            <a:noAutofit/>
-          </a:bodyPr>
-          <a:lstStyle/>
-          <a:p>
-            <a:pPr marL="0" lvl="0" indent="0" algn="l" rtl="0">
-              <a:spcBef>
-                <a:spcPts val="0"/>
-              </a:spcBef>
-              <a:spcAft>
-                <a:spcPts val="0"/>
-              </a:spcAft>
-              <a:buNone/>
-            </a:pPr>
-            <a:r>
-              <a:rPr lang="en"/>
-              <a:t>06</a:t>
             </a:r>
             <a:endParaRPr/>
           </a:p>
@@ -11863,7 +11821,7 @@
         </p:nvSpPr>
         <p:spPr>
           <a:xfrm>
-            <a:off x="720000" y="3650504"/>
+            <a:off x="1725286" y="3433094"/>
             <a:ext cx="2409600" cy="484800"/>
           </a:xfrm>
           <a:prstGeom prst="rect">
@@ -11905,7 +11863,7 @@
         </p:nvSpPr>
         <p:spPr>
           <a:xfrm>
-            <a:off x="3367204" y="3650504"/>
+            <a:off x="4372490" y="3433094"/>
             <a:ext cx="2409600" cy="484800"/>
           </a:xfrm>
           <a:prstGeom prst="rect">
@@ -11934,48 +11892,6 @@
             <a:r>
               <a:rPr lang="en-US" dirty="0" err="1"/>
               <a:t>echnologies</a:t>
-            </a:r>
-            <a:endParaRPr dirty="0"/>
-          </a:p>
-        </p:txBody>
-      </p:sp>
-      <p:sp>
-        <p:nvSpPr>
-          <p:cNvPr id="480" name="Google Shape;480;p39"/>
-          <p:cNvSpPr txBox="1">
-            <a:spLocks noGrp="1"/>
-          </p:cNvSpPr>
-          <p:nvPr>
-            <p:ph type="subTitle" idx="21"/>
-          </p:nvPr>
-        </p:nvSpPr>
-        <p:spPr>
-          <a:xfrm>
-            <a:off x="6014390" y="3650504"/>
-            <a:ext cx="2409600" cy="484800"/>
-          </a:xfrm>
-          <a:prstGeom prst="rect">
-            <a:avLst/>
-          </a:prstGeom>
-        </p:spPr>
-        <p:txBody>
-          <a:bodyPr spcFirstLastPara="1" wrap="square" lIns="91425" tIns="91425" rIns="91425" bIns="91425" anchor="b" anchorCtr="0">
-            <a:noAutofit/>
-          </a:bodyPr>
-          <a:lstStyle/>
-          <a:p>
-            <a:pPr marL="0" lvl="0" indent="0" algn="l" rtl="0">
-              <a:spcBef>
-                <a:spcPts val="0"/>
-              </a:spcBef>
-              <a:spcAft>
-                <a:spcPts val="0"/>
-              </a:spcAft>
-              <a:buNone/>
-            </a:pPr>
-            <a:r>
-              <a:rPr lang="en-US" dirty="0"/>
-              <a:t>Conclusion</a:t>
             </a:r>
             <a:endParaRPr dirty="0"/>
           </a:p>
@@ -15283,8 +15199,8 @@
         </p:nvSpPr>
         <p:spPr>
           <a:xfrm>
-            <a:off x="4784056" y="1259225"/>
-            <a:ext cx="3392023" cy="745977"/>
+            <a:off x="2248374" y="1716283"/>
+            <a:ext cx="4389120" cy="1822181"/>
           </a:xfrm>
           <a:prstGeom prst="rect">
             <a:avLst/>
@@ -15296,7 +15212,7 @@
           </a:bodyPr>
           <a:lstStyle/>
           <a:p>
-            <a:pPr marL="0" lvl="0" indent="0" algn="l" rtl="0">
+            <a:pPr marL="0" lvl="0" indent="0" algn="ctr" rtl="0">
               <a:spcBef>
                 <a:spcPts val="0"/>
               </a:spcBef>
@@ -15306,10 +15222,10 @@
               <a:buNone/>
             </a:pPr>
             <a:r>
-              <a:rPr lang="en-US" sz="3600" dirty="0"/>
-              <a:t>Conclusion</a:t>
+              <a:rPr lang="en-US" sz="4400" dirty="0"/>
+              <a:t>Time to take a look at the website</a:t>
             </a:r>
-            <a:endParaRPr sz="3600" dirty="0"/>
+            <a:endParaRPr sz="4400" dirty="0"/>
           </a:p>
         </p:txBody>
       </p:sp>
@@ -15649,282 +15565,6 @@
           </a:ln>
         </p:spPr>
       </p:pic>
-      <p:sp>
-        <p:nvSpPr>
-          <p:cNvPr id="2" name="Google Shape;503;p41">
-            <a:extLst>
-              <a:ext uri="{FF2B5EF4-FFF2-40B4-BE49-F238E27FC236}">
-                <a16:creationId xmlns:a16="http://schemas.microsoft.com/office/drawing/2014/main" id="{35B3E31F-6520-6C49-86A7-8F946A6F0CEF}"/>
-              </a:ext>
-            </a:extLst>
-          </p:cNvPr>
-          <p:cNvSpPr txBox="1">
-            <a:spLocks/>
-          </p:cNvSpPr>
-          <p:nvPr/>
-        </p:nvSpPr>
-        <p:spPr>
-          <a:xfrm>
-            <a:off x="3735990" y="1112797"/>
-            <a:ext cx="1652100" cy="915900"/>
-          </a:xfrm>
-          <a:prstGeom prst="rect">
-            <a:avLst/>
-          </a:prstGeom>
-        </p:spPr>
-        <p:txBody>
-          <a:bodyPr spcFirstLastPara="1" wrap="square" lIns="91425" tIns="91425" rIns="91425" bIns="91425" anchor="ctr" anchorCtr="0">
-            <a:noAutofit/>
-          </a:bodyPr>
-          <a:lstStyle>
-            <a:defPPr marR="0" lvl="0" algn="l" rtl="0">
-              <a:lnSpc>
-                <a:spcPct val="100000"/>
-              </a:lnSpc>
-              <a:spcBef>
-                <a:spcPts val="0"/>
-              </a:spcBef>
-              <a:spcAft>
-                <a:spcPts val="0"/>
-              </a:spcAft>
-            </a:defPPr>
-            <a:lvl1pPr marR="0" lvl="0" algn="l" rtl="0">
-              <a:lnSpc>
-                <a:spcPct val="100000"/>
-              </a:lnSpc>
-              <a:spcBef>
-                <a:spcPts val="0"/>
-              </a:spcBef>
-              <a:spcAft>
-                <a:spcPts val="0"/>
-              </a:spcAft>
-              <a:buClr>
-                <a:srgbClr val="000000"/>
-              </a:buClr>
-              <a:buFont typeface="Arial"/>
-              <a:defRPr sz="1400" b="0" i="0" u="none" strike="noStrike" cap="none">
-                <a:solidFill>
-                  <a:srgbClr val="000000"/>
-                </a:solidFill>
-                <a:latin typeface="Arial"/>
-                <a:ea typeface="Arial"/>
-                <a:cs typeface="Arial"/>
-                <a:sym typeface="Arial"/>
-              </a:defRPr>
-            </a:lvl1pPr>
-            <a:lvl2pPr marR="0" lvl="1" algn="l" rtl="0">
-              <a:lnSpc>
-                <a:spcPct val="100000"/>
-              </a:lnSpc>
-              <a:spcBef>
-                <a:spcPts val="0"/>
-              </a:spcBef>
-              <a:spcAft>
-                <a:spcPts val="0"/>
-              </a:spcAft>
-              <a:buClr>
-                <a:srgbClr val="000000"/>
-              </a:buClr>
-              <a:buFont typeface="Arial"/>
-              <a:defRPr sz="1400" b="0" i="0" u="none" strike="noStrike" cap="none">
-                <a:solidFill>
-                  <a:srgbClr val="000000"/>
-                </a:solidFill>
-                <a:latin typeface="Arial"/>
-                <a:ea typeface="Arial"/>
-                <a:cs typeface="Arial"/>
-                <a:sym typeface="Arial"/>
-              </a:defRPr>
-            </a:lvl2pPr>
-            <a:lvl3pPr marR="0" lvl="2" algn="l" rtl="0">
-              <a:lnSpc>
-                <a:spcPct val="100000"/>
-              </a:lnSpc>
-              <a:spcBef>
-                <a:spcPts val="0"/>
-              </a:spcBef>
-              <a:spcAft>
-                <a:spcPts val="0"/>
-              </a:spcAft>
-              <a:buClr>
-                <a:srgbClr val="000000"/>
-              </a:buClr>
-              <a:buFont typeface="Arial"/>
-              <a:defRPr sz="1400" b="0" i="0" u="none" strike="noStrike" cap="none">
-                <a:solidFill>
-                  <a:srgbClr val="000000"/>
-                </a:solidFill>
-                <a:latin typeface="Arial"/>
-                <a:ea typeface="Arial"/>
-                <a:cs typeface="Arial"/>
-                <a:sym typeface="Arial"/>
-              </a:defRPr>
-            </a:lvl3pPr>
-            <a:lvl4pPr marR="0" lvl="3" algn="l" rtl="0">
-              <a:lnSpc>
-                <a:spcPct val="100000"/>
-              </a:lnSpc>
-              <a:spcBef>
-                <a:spcPts val="0"/>
-              </a:spcBef>
-              <a:spcAft>
-                <a:spcPts val="0"/>
-              </a:spcAft>
-              <a:buClr>
-                <a:srgbClr val="000000"/>
-              </a:buClr>
-              <a:buFont typeface="Arial"/>
-              <a:defRPr sz="1400" b="0" i="0" u="none" strike="noStrike" cap="none">
-                <a:solidFill>
-                  <a:srgbClr val="000000"/>
-                </a:solidFill>
-                <a:latin typeface="Arial"/>
-                <a:ea typeface="Arial"/>
-                <a:cs typeface="Arial"/>
-                <a:sym typeface="Arial"/>
-              </a:defRPr>
-            </a:lvl4pPr>
-            <a:lvl5pPr marR="0" lvl="4" algn="l" rtl="0">
-              <a:lnSpc>
-                <a:spcPct val="100000"/>
-              </a:lnSpc>
-              <a:spcBef>
-                <a:spcPts val="0"/>
-              </a:spcBef>
-              <a:spcAft>
-                <a:spcPts val="0"/>
-              </a:spcAft>
-              <a:buClr>
-                <a:srgbClr val="000000"/>
-              </a:buClr>
-              <a:buFont typeface="Arial"/>
-              <a:defRPr sz="1400" b="0" i="0" u="none" strike="noStrike" cap="none">
-                <a:solidFill>
-                  <a:srgbClr val="000000"/>
-                </a:solidFill>
-                <a:latin typeface="Arial"/>
-                <a:ea typeface="Arial"/>
-                <a:cs typeface="Arial"/>
-                <a:sym typeface="Arial"/>
-              </a:defRPr>
-            </a:lvl5pPr>
-            <a:lvl6pPr marR="0" lvl="5" algn="l" rtl="0">
-              <a:lnSpc>
-                <a:spcPct val="100000"/>
-              </a:lnSpc>
-              <a:spcBef>
-                <a:spcPts val="0"/>
-              </a:spcBef>
-              <a:spcAft>
-                <a:spcPts val="0"/>
-              </a:spcAft>
-              <a:buClr>
-                <a:srgbClr val="000000"/>
-              </a:buClr>
-              <a:buFont typeface="Arial"/>
-              <a:defRPr sz="1400" b="0" i="0" u="none" strike="noStrike" cap="none">
-                <a:solidFill>
-                  <a:srgbClr val="000000"/>
-                </a:solidFill>
-                <a:latin typeface="Arial"/>
-                <a:ea typeface="Arial"/>
-                <a:cs typeface="Arial"/>
-                <a:sym typeface="Arial"/>
-              </a:defRPr>
-            </a:lvl6pPr>
-            <a:lvl7pPr marR="0" lvl="6" algn="l" rtl="0">
-              <a:lnSpc>
-                <a:spcPct val="100000"/>
-              </a:lnSpc>
-              <a:spcBef>
-                <a:spcPts val="0"/>
-              </a:spcBef>
-              <a:spcAft>
-                <a:spcPts val="0"/>
-              </a:spcAft>
-              <a:buClr>
-                <a:srgbClr val="000000"/>
-              </a:buClr>
-              <a:buFont typeface="Arial"/>
-              <a:defRPr sz="1400" b="0" i="0" u="none" strike="noStrike" cap="none">
-                <a:solidFill>
-                  <a:srgbClr val="000000"/>
-                </a:solidFill>
-                <a:latin typeface="Arial"/>
-                <a:ea typeface="Arial"/>
-                <a:cs typeface="Arial"/>
-                <a:sym typeface="Arial"/>
-              </a:defRPr>
-            </a:lvl7pPr>
-            <a:lvl8pPr marR="0" lvl="7" algn="l" rtl="0">
-              <a:lnSpc>
-                <a:spcPct val="100000"/>
-              </a:lnSpc>
-              <a:spcBef>
-                <a:spcPts val="0"/>
-              </a:spcBef>
-              <a:spcAft>
-                <a:spcPts val="0"/>
-              </a:spcAft>
-              <a:buClr>
-                <a:srgbClr val="000000"/>
-              </a:buClr>
-              <a:buFont typeface="Arial"/>
-              <a:defRPr sz="1400" b="0" i="0" u="none" strike="noStrike" cap="none">
-                <a:solidFill>
-                  <a:srgbClr val="000000"/>
-                </a:solidFill>
-                <a:latin typeface="Arial"/>
-                <a:ea typeface="Arial"/>
-                <a:cs typeface="Arial"/>
-                <a:sym typeface="Arial"/>
-              </a:defRPr>
-            </a:lvl8pPr>
-            <a:lvl9pPr marR="0" lvl="8" algn="l" rtl="0">
-              <a:lnSpc>
-                <a:spcPct val="100000"/>
-              </a:lnSpc>
-              <a:spcBef>
-                <a:spcPts val="0"/>
-              </a:spcBef>
-              <a:spcAft>
-                <a:spcPts val="0"/>
-              </a:spcAft>
-              <a:buClr>
-                <a:srgbClr val="000000"/>
-              </a:buClr>
-              <a:buFont typeface="Arial"/>
-              <a:defRPr sz="1400" b="0" i="0" u="none" strike="noStrike" cap="none">
-                <a:solidFill>
-                  <a:srgbClr val="000000"/>
-                </a:solidFill>
-                <a:latin typeface="Arial"/>
-                <a:ea typeface="Arial"/>
-                <a:cs typeface="Arial"/>
-                <a:sym typeface="Arial"/>
-              </a:defRPr>
-            </a:lvl9pPr>
-          </a:lstStyle>
-          <a:p>
-            <a:pPr>
-              <a:buClr>
-                <a:schemeClr val="lt1"/>
-              </a:buClr>
-              <a:buSzPts val="6000"/>
-            </a:pPr>
-            <a:r>
-              <a:rPr lang="en" sz="5500" b="1" dirty="0">
-                <a:solidFill>
-                  <a:srgbClr val="E67F49"/>
-                </a:solidFill>
-                <a:latin typeface="Montserrat"/>
-                <a:sym typeface="Montserrat"/>
-              </a:rPr>
-              <a:t>06</a:t>
-            </a:r>
-          </a:p>
-        </p:txBody>
-      </p:sp>
     </p:spTree>
     <p:extLst>
       <p:ext uri="{BB962C8B-B14F-4D97-AF65-F5344CB8AC3E}">

</xml_diff>